<commit_message>
Añade cambios en presentacion pp
</commit_message>
<xml_diff>
--- a/GO_presentacion.pptx
+++ b/GO_presentacion.pptx
@@ -7916,7 +7916,7 @@
         </p:spPr>
         <p:txBody>
           <a:bodyPr>
-            <a:normAutofit/>
+            <a:normAutofit lnSpcReduction="10000"/>
           </a:bodyPr>
           <a:lstStyle/>
           <a:p>
@@ -7931,8 +7931,45 @@
             </a:pPr>
             <a:r>
               <a:rPr lang="es-MX" sz="3000" dirty="0" smtClean="0"/>
-              <a:t>Recibe recompensas en puntos canjeables en productos o servicios al publicar, comentar, interactuar, pero sobre todo al ayudar a alguien de la comunidad.</a:t>
-            </a:r>
+              <a:t>Recibe recompensas en puntos canjeables en productos o servicios al publicar, comentar, interactuar, pero sobre todo al ayudar a </a:t>
+            </a:r>
+            <a:r>
+              <a:rPr lang="es-MX" sz="3000" dirty="0" err="1" smtClean="0"/>
+              <a:t>l@s</a:t>
+            </a:r>
+            <a:r>
+              <a:rPr lang="es-MX" sz="3000" dirty="0" smtClean="0"/>
+              <a:t> </a:t>
+            </a:r>
+            <a:r>
+              <a:rPr lang="es-MX" sz="3000" dirty="0" err="1" smtClean="0"/>
+              <a:t>miebr@s</a:t>
+            </a:r>
+            <a:r>
+              <a:rPr lang="es-MX" sz="3000" dirty="0" smtClean="0"/>
+              <a:t> </a:t>
+            </a:r>
+            <a:r>
+              <a:rPr lang="es-MX" sz="3000" dirty="0" smtClean="0"/>
+              <a:t>de </a:t>
+            </a:r>
+            <a:r>
+              <a:rPr lang="es-MX" sz="3000" dirty="0" smtClean="0"/>
+              <a:t>la </a:t>
+            </a:r>
+            <a:r>
+              <a:rPr lang="es-MX" sz="3000" dirty="0" smtClean="0"/>
+              <a:t>comunidad </a:t>
+            </a:r>
+            <a:r>
+              <a:rPr lang="es-MX" sz="3000" i="1" dirty="0" smtClean="0"/>
+              <a:t>GO!</a:t>
+            </a:r>
+            <a:r>
+              <a:rPr lang="es-MX" sz="3000" dirty="0" smtClean="0"/>
+              <a:t>.</a:t>
+            </a:r>
+            <a:endParaRPr lang="es-MX" sz="3000" dirty="0" smtClean="0"/>
           </a:p>
           <a:p>
             <a:pPr marL="0" indent="0" algn="ctr">
@@ -7946,7 +7983,23 @@
             </a:pPr>
             <a:r>
               <a:rPr lang="es-MX" sz="3000" dirty="0" smtClean="0"/>
-              <a:t>Mientras más participas, obtienes más beneficios.</a:t>
+              <a:t>Mientras más </a:t>
+            </a:r>
+            <a:r>
+              <a:rPr lang="es-MX" sz="3000" dirty="0" smtClean="0"/>
+              <a:t>participas con </a:t>
+            </a:r>
+            <a:r>
+              <a:rPr lang="es-MX" sz="3000" i="1" dirty="0" smtClean="0"/>
+              <a:t>GO!</a:t>
+            </a:r>
+            <a:r>
+              <a:rPr lang="es-MX" sz="3000" dirty="0" smtClean="0"/>
+              <a:t>, </a:t>
+            </a:r>
+            <a:r>
+              <a:rPr lang="es-MX" sz="3000" dirty="0" smtClean="0"/>
+              <a:t>obtienes más beneficios.</a:t>
             </a:r>
           </a:p>
           <a:p>
@@ -8215,25 +8268,13 @@
           <a:p>
             <a:r>
               <a:rPr lang="es-MX" dirty="0" smtClean="0"/>
-              <a:t>Te ayudamos a </a:t>
-            </a:r>
+              <a:t>Te ayudamos a planificar: publica tu destino y fecha tentativa de viaje y la comunidad puede darte recomendaciones que ayuden a mejorar tu experiencia </a:t>
+            </a:r>
+          </a:p>
+          <a:p>
             <a:r>
               <a:rPr lang="es-MX" dirty="0" smtClean="0"/>
-              <a:t>planificar: </a:t>
-            </a:r>
-            <a:r>
-              <a:rPr lang="es-MX" dirty="0" smtClean="0"/>
-              <a:t>publica tu destino y fecha tentativa de viaje y la comunidad puede darte recomendaciones que ayuden a mejorar tu experiencia </a:t>
-            </a:r>
-          </a:p>
-          <a:p>
-            <a:r>
-              <a:rPr lang="es-MX" dirty="0" smtClean="0"/>
-              <a:t>Status: publica tu </a:t>
-            </a:r>
-            <a:r>
-              <a:rPr lang="es-MX" dirty="0" smtClean="0"/>
-              <a:t>estado. </a:t>
+              <a:t>Status: publica tu estado. </a:t>
             </a:r>
             <a:r>
               <a:rPr lang="es-MX" dirty="0"/>
@@ -8241,11 +8282,7 @@
             </a:r>
             <a:r>
               <a:rPr lang="es-MX" dirty="0" smtClean="0"/>
-              <a:t>i </a:t>
-            </a:r>
-            <a:r>
-              <a:rPr lang="es-MX" dirty="0" smtClean="0"/>
-              <a:t>estás en planes, si estas viajando o estas en casa.</a:t>
+              <a:t>i estás en planes, si estas viajando o estas en casa.</a:t>
             </a:r>
           </a:p>
           <a:p>
@@ -8357,6 +8394,13 @@
   <p:clrMapOvr>
     <a:masterClrMapping/>
   </p:clrMapOvr>
+  <p:timing>
+    <p:tnLst>
+      <p:par>
+        <p:cTn id="1" dur="indefinite" restart="never" nodeType="tmRoot"/>
+      </p:par>
+    </p:tnLst>
+  </p:timing>
 </p:sld>
 </file>
 
@@ -8393,12 +8437,16 @@
           <a:lstStyle/>
           <a:p>
             <a:r>
-              <a:rPr lang="es-MX" dirty="0"/>
-              <a:t>I</a:t>
-            </a:r>
-            <a:r>
               <a:rPr lang="es-MX" dirty="0" smtClean="0"/>
-              <a:t>deas principales</a:t>
+              <a:t>¿Por qué elegir </a:t>
+            </a:r>
+            <a:r>
+              <a:rPr lang="es-MX" i="1" dirty="0" smtClean="0"/>
+              <a:t>GO!</a:t>
+            </a:r>
+            <a:r>
+              <a:rPr lang="es-MX" dirty="0" smtClean="0"/>
+              <a:t>?</a:t>
             </a:r>
             <a:endParaRPr lang="es-MX" dirty="0"/>
           </a:p>
@@ -8426,12 +8474,41 @@
           <a:p>
             <a:r>
               <a:rPr lang="es-MX" dirty="0"/>
-              <a:t>En GO siempre hay alguien a quien preguntar y pedirle consejos</a:t>
+              <a:t>En </a:t>
+            </a:r>
+            <a:r>
+              <a:rPr lang="es-MX" i="1" dirty="0" smtClean="0"/>
+              <a:t>GO!</a:t>
+            </a:r>
+            <a:r>
+              <a:rPr lang="es-MX" dirty="0" smtClean="0"/>
+              <a:t> </a:t>
+            </a:r>
+            <a:r>
+              <a:rPr lang="es-MX" dirty="0"/>
+              <a:t>siempre </a:t>
+            </a:r>
+            <a:r>
+              <a:rPr lang="es-MX" dirty="0" smtClean="0"/>
+              <a:t>encuentro a</a:t>
+            </a:r>
+            <a:r>
+              <a:rPr lang="es-MX" dirty="0" smtClean="0"/>
+              <a:t> </a:t>
+            </a:r>
+            <a:r>
+              <a:rPr lang="es-MX" dirty="0"/>
+              <a:t>alguien </a:t>
+            </a:r>
+            <a:r>
+              <a:rPr lang="es-MX" dirty="0" smtClean="0"/>
+              <a:t>que me ayuda a hacer de cada viaje una experiencia extraordinaria</a:t>
             </a:r>
             <a:r>
               <a:rPr lang="es-MX" dirty="0" smtClean="0"/>
               <a:t>.</a:t>
             </a:r>
+            <a:endParaRPr lang="es-MX" dirty="0" smtClean="0"/>
           </a:p>
           <a:p>
             <a:endParaRPr lang="es-MX" dirty="0"/>
@@ -8439,7 +8516,19 @@
           <a:p>
             <a:r>
               <a:rPr lang="es-MX" dirty="0"/>
-              <a:t>Con GO puedo acumular puntos por recompensas</a:t>
+              <a:t>Con </a:t>
+            </a:r>
+            <a:r>
+              <a:rPr lang="es-MX" i="1" dirty="0" smtClean="0"/>
+              <a:t>GO!</a:t>
+            </a:r>
+            <a:r>
+              <a:rPr lang="es-MX" dirty="0" smtClean="0"/>
+              <a:t> </a:t>
+            </a:r>
+            <a:r>
+              <a:rPr lang="es-MX" dirty="0"/>
+              <a:t>puedo acumular puntos por recompensas</a:t>
             </a:r>
             <a:r>
               <a:rPr lang="es-MX" dirty="0" smtClean="0"/>
@@ -8455,7 +8544,19 @@
           <a:p>
             <a:r>
               <a:rPr lang="es-MX" dirty="0"/>
-              <a:t>Puedo publicar en GO mis experiencias de viaje y automáticamente se publicarán en mis redes sociales.</a:t>
+              <a:t>Puedo publicar en </a:t>
+            </a:r>
+            <a:r>
+              <a:rPr lang="es-MX" i="1" dirty="0" smtClean="0"/>
+              <a:t>GO!</a:t>
+            </a:r>
+            <a:r>
+              <a:rPr lang="es-MX" dirty="0" smtClean="0"/>
+              <a:t> </a:t>
+            </a:r>
+            <a:r>
+              <a:rPr lang="es-MX" dirty="0"/>
+              <a:t>mis experiencias de viaje y automáticamente se publicarán en mis redes sociales.</a:t>
             </a:r>
           </a:p>
           <a:p>
@@ -8722,7 +8823,12 @@
             <p:ph type="title"/>
           </p:nvPr>
         </p:nvSpPr>
-        <p:spPr/>
+        <p:spPr>
+          <a:xfrm>
+            <a:off x="680320" y="583410"/>
+            <a:ext cx="9613861" cy="1080938"/>
+          </a:xfrm>
+        </p:spPr>
         <p:txBody>
           <a:bodyPr>
             <a:normAutofit fontScale="90000"/>
@@ -8738,23 +8844,22 @@
             </a:br>
             <a:r>
               <a:rPr lang="es-MX" dirty="0" smtClean="0"/>
-              <a:t>No </a:t>
-            </a:r>
-            <a:r>
-              <a:rPr lang="es-MX" dirty="0"/>
-              <a:t>quieres quedarte con la duda de qué hubiese pasado si</a:t>
-            </a:r>
-            <a:r>
+              <a:t/>
+            </a:r>
+            <a:br>
               <a:rPr lang="es-MX" dirty="0" smtClean="0"/>
-              <a:t>…                </a:t>
-            </a:r>
+            </a:br>
             <a:r>
               <a:rPr lang="es-MX" dirty="0" smtClean="0"/>
-              <a:t>               </a:t>
+              <a:t>¿Te has preguntado de qué te estas perdiendo aquí y ahora? 						</a:t>
             </a:r>
             <a:r>
               <a:rPr lang="es-MX" sz="4400" i="1" dirty="0" smtClean="0"/>
-              <a:t>GO!</a:t>
+              <a:t>GO</a:t>
+            </a:r>
+            <a:r>
+              <a:rPr lang="es-MX" sz="4400" i="1" dirty="0" smtClean="0"/>
+              <a:t>!</a:t>
             </a:r>
             <a:r>
               <a:rPr lang="es-MX" dirty="0"/>
@@ -8777,7 +8882,12 @@
             <p:ph idx="1"/>
           </p:nvPr>
         </p:nvSpPr>
-        <p:spPr/>
+        <p:spPr>
+          <a:xfrm>
+            <a:off x="680320" y="2180118"/>
+            <a:ext cx="9848343" cy="4246808"/>
+          </a:xfrm>
+        </p:spPr>
         <p:txBody>
           <a:bodyPr/>
           <a:lstStyle/>
@@ -8785,25 +8895,96 @@
             <a:pPr marL="0" indent="0">
               <a:buNone/>
             </a:pPr>
-            <a:r>
-              <a:rPr lang="es-MX" dirty="0" smtClean="0"/>
-              <a:t>Algunas experiencias de viaje de </a:t>
-            </a:r>
-            <a:r>
-              <a:rPr lang="es-MX" dirty="0" err="1" smtClean="0"/>
+            <a:endParaRPr lang="es-MX" sz="2000" dirty="0" smtClean="0"/>
+          </a:p>
+          <a:p>
+            <a:pPr marL="0" indent="0">
+              <a:buNone/>
+            </a:pPr>
+            <a:r>
+              <a:rPr lang="es-MX" sz="2000" dirty="0" smtClean="0"/>
+              <a:t>Razones por las que </a:t>
+            </a:r>
+            <a:r>
+              <a:rPr lang="es-MX" sz="2000" dirty="0" err="1" smtClean="0"/>
               <a:t>nuestr@s</a:t>
             </a:r>
             <a:r>
-              <a:rPr lang="es-MX" dirty="0" smtClean="0"/>
+              <a:rPr lang="es-MX" sz="2000" dirty="0" smtClean="0"/>
               <a:t> </a:t>
             </a:r>
             <a:r>
-              <a:rPr lang="es-MX" dirty="0" err="1" smtClean="0"/>
+              <a:rPr lang="es-MX" sz="2000" dirty="0" err="1" smtClean="0"/>
               <a:t>usuari@s</a:t>
             </a:r>
             <a:r>
-              <a:rPr lang="es-MX" dirty="0" smtClean="0"/>
-              <a:t>:</a:t>
+              <a:rPr lang="es-MX" sz="2000" dirty="0" smtClean="0"/>
+              <a:t> dicen que vale la pena viajar en aventura al extranjero:</a:t>
+            </a:r>
+          </a:p>
+          <a:p>
+            <a:pPr marL="0" indent="0">
+              <a:buNone/>
+            </a:pPr>
+            <a:endParaRPr lang="es-MX" sz="2000" dirty="0"/>
+          </a:p>
+          <a:p>
+            <a:r>
+              <a:rPr lang="es-MX" sz="2000" dirty="0" smtClean="0"/>
+              <a:t>“Me </a:t>
+            </a:r>
+            <a:r>
+              <a:rPr lang="es-MX" sz="2000" dirty="0"/>
+              <a:t>quedé más de 200 veces en casas de familia alrededor del </a:t>
+            </a:r>
+            <a:r>
+              <a:rPr lang="es-MX" sz="2000" dirty="0" smtClean="0"/>
+              <a:t>mundo”</a:t>
+            </a:r>
+            <a:endParaRPr lang="es-MX" sz="2000" dirty="0"/>
+          </a:p>
+          <a:p>
+            <a:r>
+              <a:rPr lang="es-MX" sz="2000" dirty="0" smtClean="0"/>
+              <a:t>“Me </a:t>
+            </a:r>
+            <a:r>
+              <a:rPr lang="es-MX" sz="2000" dirty="0"/>
+              <a:t>animé a hablar con extraños y a </a:t>
+            </a:r>
+            <a:r>
+              <a:rPr lang="es-MX" sz="2000" dirty="0" smtClean="0"/>
+              <a:t>fotografiarlos”</a:t>
+            </a:r>
+            <a:endParaRPr lang="es-MX" sz="2000" dirty="0"/>
+          </a:p>
+          <a:p>
+            <a:r>
+              <a:rPr lang="es-MX" sz="2000" dirty="0" smtClean="0"/>
+              <a:t>“Probé </a:t>
+            </a:r>
+            <a:r>
+              <a:rPr lang="es-MX" sz="2000" dirty="0"/>
+              <a:t>comidas de todos los </a:t>
+            </a:r>
+            <a:r>
+              <a:rPr lang="es-MX" sz="2000" dirty="0" smtClean="0"/>
+              <a:t>continentes”</a:t>
+            </a:r>
+            <a:endParaRPr lang="es-MX" sz="2000" dirty="0"/>
+          </a:p>
+          <a:p>
+            <a:r>
+              <a:rPr lang="es-MX" sz="2000" dirty="0" smtClean="0"/>
+              <a:t>“Conocí </a:t>
+            </a:r>
+            <a:r>
+              <a:rPr lang="es-MX" sz="2000" dirty="0"/>
+              <a:t>a algunas de las personas más importantes de mi </a:t>
+            </a:r>
+            <a:r>
+              <a:rPr lang="es-MX" sz="2000" dirty="0" smtClean="0"/>
+              <a:t>vida”</a:t>
             </a:r>
           </a:p>
           <a:p>
@@ -8813,63 +8994,21 @@
             <a:endParaRPr lang="es-MX" dirty="0"/>
           </a:p>
           <a:p>
-            <a:r>
-              <a:rPr lang="es-MX" dirty="0" smtClean="0"/>
-              <a:t>Me </a:t>
-            </a:r>
-            <a:r>
-              <a:rPr lang="es-MX" dirty="0"/>
-              <a:t>quedé más de 200 veces en casas de familia alrededor del </a:t>
-            </a:r>
-            <a:r>
-              <a:rPr lang="es-MX" dirty="0" smtClean="0"/>
-              <a:t>mundo</a:t>
-            </a:r>
+            <a:pPr marL="0" indent="0">
+              <a:buNone/>
+            </a:pPr>
+            <a:r>
+              <a:rPr lang="es-MX" i="1" dirty="0" smtClean="0"/>
+              <a:t>                                       ¡Experiencias que vale la pena compartir!</a:t>
+            </a:r>
+          </a:p>
+          <a:p>
             <a:endParaRPr lang="es-MX" dirty="0"/>
           </a:p>
           <a:p>
-            <a:r>
-              <a:rPr lang="es-MX" dirty="0" smtClean="0"/>
-              <a:t>Me </a:t>
-            </a:r>
-            <a:r>
-              <a:rPr lang="es-MX" dirty="0"/>
-              <a:t>animé a hablar con extraños y a </a:t>
-            </a:r>
-            <a:r>
-              <a:rPr lang="es-MX" dirty="0" smtClean="0"/>
-              <a:t>fotografiarlos</a:t>
-            </a:r>
-            <a:endParaRPr lang="es-MX" dirty="0"/>
-          </a:p>
-          <a:p>
-            <a:r>
-              <a:rPr lang="es-MX" dirty="0" smtClean="0"/>
-              <a:t>Probé </a:t>
-            </a:r>
-            <a:r>
-              <a:rPr lang="es-MX" dirty="0"/>
-              <a:t>comidas de todos los </a:t>
-            </a:r>
-            <a:r>
-              <a:rPr lang="es-MX" dirty="0" smtClean="0"/>
-              <a:t>continentes</a:t>
-            </a:r>
-            <a:endParaRPr lang="es-MX" dirty="0"/>
-          </a:p>
-          <a:p>
-            <a:r>
-              <a:rPr lang="es-MX" dirty="0" smtClean="0"/>
-              <a:t>Conocí </a:t>
-            </a:r>
-            <a:r>
-              <a:rPr lang="es-MX" dirty="0"/>
-              <a:t>a algunas de las personas más importantes de mi </a:t>
-            </a:r>
-            <a:r>
-              <a:rPr lang="es-MX" dirty="0" smtClean="0"/>
-              <a:t>vida</a:t>
-            </a:r>
+            <a:endParaRPr lang="es-MX" dirty="0" smtClean="0"/>
+          </a:p>
+          <a:p>
             <a:endParaRPr lang="es-MX" dirty="0"/>
           </a:p>
           <a:p>
@@ -9239,7 +9378,15 @@
             </a:pPr>
             <a:r>
               <a:rPr lang="es-MX" sz="1800" dirty="0"/>
-              <a:t>Viaja por placer pero nunca desaprovecha la oportunidad de difundir la partería y los derechos de las madres y sus bebés en embarazo parto y puerperio. Promueve los derechos de las mujeres en general. Ama su trabajo</a:t>
+              <a:t>Viaja por placer pero nunca desaprovecha la oportunidad de difundir la partería y los derechos de las madres y sus bebés en </a:t>
+            </a:r>
+            <a:r>
+              <a:rPr lang="es-MX" sz="1800" dirty="0" smtClean="0"/>
+              <a:t>embarazo, </a:t>
+            </a:r>
+            <a:r>
+              <a:rPr lang="es-MX" sz="1800" dirty="0"/>
+              <a:t>parto y puerperio. Promueve los derechos de las mujeres en general. Ama su trabajo</a:t>
             </a:r>
           </a:p>
           <a:p>
@@ -10080,7 +10227,23 @@
           <a:p>
             <a:r>
               <a:rPr lang="es-MX" dirty="0" smtClean="0"/>
-              <a:t>Me hubiera gustado que alguien me recomendara un lugar barato para cenar por la noche en NY. Llegué harta de los </a:t>
+              <a:t>Me hubiera gustado que alguien me recomendara un lugar barato para cenar por la noche en NY. </a:t>
+            </a:r>
+            <a:r>
+              <a:rPr lang="es-MX" dirty="0" smtClean="0"/>
+              <a:t>La primera vez </a:t>
+            </a:r>
+            <a:r>
+              <a:rPr lang="es-MX" dirty="0" smtClean="0"/>
+              <a:t>regres</a:t>
+            </a:r>
+            <a:r>
+              <a:rPr lang="es-MX" dirty="0" smtClean="0"/>
+              <a:t>é </a:t>
+            </a:r>
+            <a:r>
+              <a:rPr lang="es-MX" dirty="0" smtClean="0"/>
+              <a:t>harta de los </a:t>
             </a:r>
             <a:r>
               <a:rPr lang="es-MX" dirty="0" err="1" smtClean="0"/>
@@ -10214,7 +10377,6 @@
               <a:rPr lang="es-MX" sz="3200" i="1" dirty="0" smtClean="0"/>
               <a:t>Yo no viajo porque…</a:t>
             </a:r>
-            <a:endParaRPr lang="es-MX" sz="3200" i="1" dirty="0" smtClean="0"/>
           </a:p>
           <a:p>
             <a:endParaRPr lang="es-MX" dirty="0" smtClean="0"/>
@@ -10286,8 +10448,29 @@
             </a:r>
             <a:r>
               <a:rPr lang="es-MX" dirty="0" smtClean="0"/>
-              <a:t>hay lugares con las tres B, pero hay que saber dónde están.</a:t>
-            </a:r>
+              <a:t>sabrás donde están los</a:t>
+            </a:r>
+            <a:r>
+              <a:rPr lang="es-MX" dirty="0" smtClean="0"/>
+              <a:t> </a:t>
+            </a:r>
+            <a:r>
+              <a:rPr lang="es-MX" dirty="0" smtClean="0"/>
+              <a:t>lugares con las tres </a:t>
+            </a:r>
+            <a:r>
+              <a:rPr lang="es-MX" dirty="0" smtClean="0"/>
+              <a:t>B</a:t>
+            </a:r>
+            <a:r>
+              <a:rPr lang="es-MX" dirty="0"/>
+              <a:t> </a:t>
+            </a:r>
+            <a:r>
+              <a:rPr lang="es-MX" dirty="0" smtClean="0"/>
+              <a:t>(Bueno, bonito y barato)</a:t>
+            </a:r>
+            <a:endParaRPr lang="es-MX" dirty="0" smtClean="0"/>
           </a:p>
           <a:p>
             <a:pPr marL="0" indent="0">
@@ -10389,7 +10572,7 @@
         <p:spPr/>
         <p:txBody>
           <a:bodyPr>
-            <a:normAutofit lnSpcReduction="10000"/>
+            <a:normAutofit fontScale="85000" lnSpcReduction="20000"/>
           </a:bodyPr>
           <a:lstStyle/>
           <a:p>
@@ -10422,9 +10605,22 @@
             <a:endParaRPr lang="es-MX" dirty="0" smtClean="0"/>
           </a:p>
           <a:p>
+            <a:endParaRPr lang="es-MX" dirty="0" smtClean="0"/>
+          </a:p>
+          <a:p>
+            <a:endParaRPr lang="es-MX" dirty="0"/>
+          </a:p>
+          <a:p>
+            <a:endParaRPr lang="es-MX" dirty="0" smtClean="0"/>
+          </a:p>
+          <a:p>
             <a:r>
               <a:rPr lang="es-MX" dirty="0" smtClean="0"/>
-              <a:t>Me da flojera tener que publicar en </a:t>
+              <a:t>Me </a:t>
+            </a:r>
+            <a:r>
+              <a:rPr lang="es-MX" dirty="0" smtClean="0"/>
+              <a:t>da flojera tener que publicar en </a:t>
             </a:r>
             <a:r>
               <a:rPr lang="es-MX" dirty="0" err="1" smtClean="0"/>
@@ -10456,7 +10652,7 @@
         </p:spPr>
         <p:txBody>
           <a:bodyPr>
-            <a:normAutofit lnSpcReduction="10000"/>
+            <a:normAutofit fontScale="85000" lnSpcReduction="20000"/>
           </a:bodyPr>
           <a:lstStyle/>
           <a:p>
@@ -10468,8 +10664,19 @@
           <a:p>
             <a:r>
               <a:rPr lang="es-MX" dirty="0" smtClean="0"/>
-              <a:t>La comunidad puede informarte acerca de los horarios y lugares más seguros para realizar tus recorridos.</a:t>
-            </a:r>
+              <a:t>La comunidad puede informarte acerca de los horarios y lugares más seguros para realizar tus recorridos</a:t>
+            </a:r>
+            <a:r>
+              <a:rPr lang="es-MX" dirty="0" smtClean="0"/>
+              <a:t>.</a:t>
+            </a:r>
+          </a:p>
+          <a:p>
+            <a:r>
+              <a:rPr lang="es-MX" dirty="0" smtClean="0"/>
+              <a:t>Si de todos modos prefieres un turismo más convencional, podrás saber acerca de los mejores lugares a los mejores precios.</a:t>
+            </a:r>
+            <a:endParaRPr lang="es-MX" dirty="0" smtClean="0"/>
           </a:p>
           <a:p>
             <a:pPr marL="0" indent="0">

</xml_diff>